<commit_message>
data for burgers equation
</commit_message>
<xml_diff>
--- a/Lecture_13_NN_Numerial_Solver.pptx
+++ b/Lecture_13_NN_Numerial_Solver.pptx
@@ -225,7 +225,7 @@
           <a:p>
             <a:fld id="{AA24CD06-CDB8-463C-82C0-327730F8ACA7}" type="datetimeFigureOut">
               <a:rPr lang="en-US" smtClean="0"/>
-              <a:t>5/10/2023</a:t>
+              <a:t>5/14/2023</a:t>
             </a:fld>
             <a:endParaRPr lang="en-US"/>
           </a:p>
@@ -3060,7 +3060,7 @@
           <a:p>
             <a:fld id="{29F8D91E-FFF0-45B5-AFE0-22E101FDFDBC}" type="datetimeFigureOut">
               <a:rPr lang="en-US" smtClean="0"/>
-              <a:t>5/10/2023</a:t>
+              <a:t>5/14/2023</a:t>
             </a:fld>
             <a:endParaRPr lang="en-US"/>
           </a:p>
@@ -3230,7 +3230,7 @@
           <a:p>
             <a:fld id="{29F8D91E-FFF0-45B5-AFE0-22E101FDFDBC}" type="datetimeFigureOut">
               <a:rPr lang="en-US" smtClean="0"/>
-              <a:t>5/10/2023</a:t>
+              <a:t>5/14/2023</a:t>
             </a:fld>
             <a:endParaRPr lang="en-US"/>
           </a:p>
@@ -3410,7 +3410,7 @@
           <a:p>
             <a:fld id="{29F8D91E-FFF0-45B5-AFE0-22E101FDFDBC}" type="datetimeFigureOut">
               <a:rPr lang="en-US" smtClean="0"/>
-              <a:t>5/10/2023</a:t>
+              <a:t>5/14/2023</a:t>
             </a:fld>
             <a:endParaRPr lang="en-US"/>
           </a:p>
@@ -3580,7 +3580,7 @@
           <a:p>
             <a:fld id="{29F8D91E-FFF0-45B5-AFE0-22E101FDFDBC}" type="datetimeFigureOut">
               <a:rPr lang="en-US" smtClean="0"/>
-              <a:t>5/10/2023</a:t>
+              <a:t>5/14/2023</a:t>
             </a:fld>
             <a:endParaRPr lang="en-US"/>
           </a:p>
@@ -3824,7 +3824,7 @@
           <a:p>
             <a:fld id="{29F8D91E-FFF0-45B5-AFE0-22E101FDFDBC}" type="datetimeFigureOut">
               <a:rPr lang="en-US" smtClean="0"/>
-              <a:t>5/10/2023</a:t>
+              <a:t>5/14/2023</a:t>
             </a:fld>
             <a:endParaRPr lang="en-US"/>
           </a:p>
@@ -4056,7 +4056,7 @@
           <a:p>
             <a:fld id="{29F8D91E-FFF0-45B5-AFE0-22E101FDFDBC}" type="datetimeFigureOut">
               <a:rPr lang="en-US" smtClean="0"/>
-              <a:t>5/10/2023</a:t>
+              <a:t>5/14/2023</a:t>
             </a:fld>
             <a:endParaRPr lang="en-US"/>
           </a:p>
@@ -4423,7 +4423,7 @@
           <a:p>
             <a:fld id="{29F8D91E-FFF0-45B5-AFE0-22E101FDFDBC}" type="datetimeFigureOut">
               <a:rPr lang="en-US" smtClean="0"/>
-              <a:t>5/10/2023</a:t>
+              <a:t>5/14/2023</a:t>
             </a:fld>
             <a:endParaRPr lang="en-US"/>
           </a:p>
@@ -4541,7 +4541,7 @@
           <a:p>
             <a:fld id="{29F8D91E-FFF0-45B5-AFE0-22E101FDFDBC}" type="datetimeFigureOut">
               <a:rPr lang="en-US" smtClean="0"/>
-              <a:t>5/10/2023</a:t>
+              <a:t>5/14/2023</a:t>
             </a:fld>
             <a:endParaRPr lang="en-US"/>
           </a:p>
@@ -4636,7 +4636,7 @@
           <a:p>
             <a:fld id="{29F8D91E-FFF0-45B5-AFE0-22E101FDFDBC}" type="datetimeFigureOut">
               <a:rPr lang="en-US" smtClean="0"/>
-              <a:t>5/10/2023</a:t>
+              <a:t>5/14/2023</a:t>
             </a:fld>
             <a:endParaRPr lang="en-US"/>
           </a:p>
@@ -4913,7 +4913,7 @@
           <a:p>
             <a:fld id="{29F8D91E-FFF0-45B5-AFE0-22E101FDFDBC}" type="datetimeFigureOut">
               <a:rPr lang="en-US" smtClean="0"/>
-              <a:t>5/10/2023</a:t>
+              <a:t>5/14/2023</a:t>
             </a:fld>
             <a:endParaRPr lang="en-US"/>
           </a:p>
@@ -5170,7 +5170,7 @@
           <a:p>
             <a:fld id="{29F8D91E-FFF0-45B5-AFE0-22E101FDFDBC}" type="datetimeFigureOut">
               <a:rPr lang="en-US" smtClean="0"/>
-              <a:t>5/10/2023</a:t>
+              <a:t>5/14/2023</a:t>
             </a:fld>
             <a:endParaRPr lang="en-US"/>
           </a:p>
@@ -5383,7 +5383,7 @@
           <a:p>
             <a:fld id="{29F8D91E-FFF0-45B5-AFE0-22E101FDFDBC}" type="datetimeFigureOut">
               <a:rPr lang="en-US" smtClean="0"/>
-              <a:t>5/10/2023</a:t>
+              <a:t>5/14/2023</a:t>
             </a:fld>
             <a:endParaRPr lang="en-US"/>
           </a:p>
@@ -8892,7 +8892,7 @@
                 <a:latin typeface="Times New Roman" panose="02020603050405020304" pitchFamily="18" charset="0"/>
                 <a:cs typeface="Times New Roman" panose="02020603050405020304" pitchFamily="18" charset="0"/>
               </a:rPr>
-              <a:t>Brief on FDM/FVM</a:t>
+              <a:t>Brief review on FDM/FVM</a:t>
             </a:r>
           </a:p>
           <a:p>
@@ -11127,7 +11127,7 @@
                 <a:latin typeface="Times New Roman" panose="02020603050405020304" pitchFamily="18" charset="0"/>
                 <a:cs typeface="Times New Roman" panose="02020603050405020304" pitchFamily="18" charset="0"/>
               </a:rPr>
-              <a:t>Brief on FDM/FVM</a:t>
+              <a:t>Brief review on FDM/FVM</a:t>
             </a:r>
           </a:p>
           <a:p>

</xml_diff>